<commit_message>
updated templates and splash pages for all lecture files
</commit_message>
<xml_diff>
--- a/LectureFiles/cbw/2017/CBW_CSHL_2017_Powerpoint_Template.pptx
+++ b/LectureFiles/cbw/2017/CBW_CSHL_2017_Powerpoint_Template.pptx
@@ -5,19 +5,18 @@
     <p:sldMasterId id="2147483648" r:id="rId1"/>
   </p:sldMasterIdLst>
   <p:notesMasterIdLst>
-    <p:notesMasterId r:id="rId9"/>
+    <p:notesMasterId r:id="rId8"/>
   </p:notesMasterIdLst>
   <p:handoutMasterIdLst>
-    <p:handoutMasterId r:id="rId10"/>
+    <p:handoutMasterId r:id="rId9"/>
   </p:handoutMasterIdLst>
   <p:sldIdLst>
     <p:sldId id="341" r:id="rId2"/>
     <p:sldId id="342" r:id="rId3"/>
     <p:sldId id="257" r:id="rId4"/>
     <p:sldId id="513" r:id="rId5"/>
-    <p:sldId id="514" r:id="rId6"/>
-    <p:sldId id="515" r:id="rId7"/>
-    <p:sldId id="512" r:id="rId8"/>
+    <p:sldId id="515" r:id="rId6"/>
+    <p:sldId id="512" r:id="rId7"/>
   </p:sldIdLst>
   <p:sldSz cx="9144000" cy="6858000" type="screen4x3"/>
   <p:notesSz cx="7315200" cy="9601200"/>
@@ -256,7 +255,7 @@
               <a:pPr>
                 <a:defRPr/>
               </a:pPr>
-              <a:t>3/4/17</a:t>
+              <a:t>7/8/17</a:t>
             </a:fld>
             <a:endParaRPr lang="en-US"/>
           </a:p>
@@ -471,7 +470,7 @@
               <a:pPr>
                 <a:defRPr/>
               </a:pPr>
-              <a:t>3/4/17</a:t>
+              <a:t>7/8/17</a:t>
             </a:fld>
             <a:endParaRPr lang="en-US"/>
           </a:p>
@@ -797,265 +796,6 @@
 </p:notesMaster>
 </file>
 
-<file path=ppt/notesSlides/notesSlide1.xml><?xml version="1.0" encoding="utf-8"?>
-<p:notes xmlns:a="http://schemas.openxmlformats.org/drawingml/2006/main" xmlns:r="http://schemas.openxmlformats.org/officeDocument/2006/relationships" xmlns:p="http://schemas.openxmlformats.org/presentationml/2006/main">
-  <p:cSld>
-    <p:spTree>
-      <p:nvGrpSpPr>
-        <p:cNvPr id="1" name=""/>
-        <p:cNvGrpSpPr/>
-        <p:nvPr/>
-      </p:nvGrpSpPr>
-      <p:grpSpPr>
-        <a:xfrm>
-          <a:off x="0" y="0"/>
-          <a:ext cx="0" cy="0"/>
-          <a:chOff x="0" y="0"/>
-          <a:chExt cx="0" cy="0"/>
-        </a:xfrm>
-      </p:grpSpPr>
-      <p:sp>
-        <p:nvSpPr>
-          <p:cNvPr id="14337" name="Rectangle 7"/>
-          <p:cNvSpPr>
-            <a:spLocks noGrp="1" noChangeArrowheads="1"/>
-          </p:cNvSpPr>
-          <p:nvPr>
-            <p:ph type="sldNum" sz="quarter" idx="5"/>
-          </p:nvPr>
-        </p:nvSpPr>
-        <p:spPr bwMode="auto">
-          <a:noFill/>
-          <a:extLst>
-            <a:ext uri="{909E8E84-426E-40dd-AFC4-6F175D3DCCD1}">
-              <a14:hiddenFill xmlns:a14="http://schemas.microsoft.com/office/drawing/2010/main">
-                <a:solidFill>
-                  <a:srgbClr val="FFFFFF"/>
-                </a:solidFill>
-              </a14:hiddenFill>
-            </a:ext>
-            <a:ext uri="{91240B29-F687-4f45-9708-019B960494DF}">
-              <a14:hiddenLine xmlns:a14="http://schemas.microsoft.com/office/drawing/2010/main" w="9525">
-                <a:solidFill>
-                  <a:srgbClr val="000000"/>
-                </a:solidFill>
-                <a:miter lim="800000"/>
-                <a:headEnd/>
-                <a:tailEnd/>
-              </a14:hiddenLine>
-            </a:ext>
-          </a:extLst>
-        </p:spPr>
-        <p:txBody>
-          <a:bodyPr/>
-          <a:lstStyle>
-            <a:lvl1pPr eaLnBrk="0" hangingPunct="0">
-              <a:defRPr sz="2400">
-                <a:solidFill>
-                  <a:schemeClr val="tx1"/>
-                </a:solidFill>
-                <a:latin typeface="Arial" charset="0"/>
-                <a:ea typeface="ＭＳ Ｐゴシック" charset="0"/>
-                <a:cs typeface="ＭＳ Ｐゴシック" charset="0"/>
-              </a:defRPr>
-            </a:lvl1pPr>
-            <a:lvl2pPr marL="742950" indent="-285750" eaLnBrk="0" hangingPunct="0">
-              <a:defRPr sz="2400">
-                <a:solidFill>
-                  <a:schemeClr val="tx1"/>
-                </a:solidFill>
-                <a:latin typeface="Arial" charset="0"/>
-                <a:ea typeface="ＭＳ Ｐゴシック" charset="0"/>
-              </a:defRPr>
-            </a:lvl2pPr>
-            <a:lvl3pPr marL="1143000" indent="-228600" eaLnBrk="0" hangingPunct="0">
-              <a:defRPr sz="2400">
-                <a:solidFill>
-                  <a:schemeClr val="tx1"/>
-                </a:solidFill>
-                <a:latin typeface="Arial" charset="0"/>
-                <a:ea typeface="ＭＳ Ｐゴシック" charset="0"/>
-              </a:defRPr>
-            </a:lvl3pPr>
-            <a:lvl4pPr marL="1600200" indent="-228600" eaLnBrk="0" hangingPunct="0">
-              <a:defRPr sz="2400">
-                <a:solidFill>
-                  <a:schemeClr val="tx1"/>
-                </a:solidFill>
-                <a:latin typeface="Arial" charset="0"/>
-                <a:ea typeface="ＭＳ Ｐゴシック" charset="0"/>
-              </a:defRPr>
-            </a:lvl4pPr>
-            <a:lvl5pPr marL="2057400" indent="-228600" eaLnBrk="0" hangingPunct="0">
-              <a:defRPr sz="2400">
-                <a:solidFill>
-                  <a:schemeClr val="tx1"/>
-                </a:solidFill>
-                <a:latin typeface="Arial" charset="0"/>
-                <a:ea typeface="ＭＳ Ｐゴシック" charset="0"/>
-              </a:defRPr>
-            </a:lvl5pPr>
-            <a:lvl6pPr marL="2514600" indent="-228600" eaLnBrk="0" fontAlgn="base" hangingPunct="0">
-              <a:spcBef>
-                <a:spcPct val="0"/>
-              </a:spcBef>
-              <a:spcAft>
-                <a:spcPct val="0"/>
-              </a:spcAft>
-              <a:defRPr sz="2400">
-                <a:solidFill>
-                  <a:schemeClr val="tx1"/>
-                </a:solidFill>
-                <a:latin typeface="Arial" charset="0"/>
-                <a:ea typeface="ＭＳ Ｐゴシック" charset="0"/>
-              </a:defRPr>
-            </a:lvl6pPr>
-            <a:lvl7pPr marL="2971800" indent="-228600" eaLnBrk="0" fontAlgn="base" hangingPunct="0">
-              <a:spcBef>
-                <a:spcPct val="0"/>
-              </a:spcBef>
-              <a:spcAft>
-                <a:spcPct val="0"/>
-              </a:spcAft>
-              <a:defRPr sz="2400">
-                <a:solidFill>
-                  <a:schemeClr val="tx1"/>
-                </a:solidFill>
-                <a:latin typeface="Arial" charset="0"/>
-                <a:ea typeface="ＭＳ Ｐゴシック" charset="0"/>
-              </a:defRPr>
-            </a:lvl7pPr>
-            <a:lvl8pPr marL="3429000" indent="-228600" eaLnBrk="0" fontAlgn="base" hangingPunct="0">
-              <a:spcBef>
-                <a:spcPct val="0"/>
-              </a:spcBef>
-              <a:spcAft>
-                <a:spcPct val="0"/>
-              </a:spcAft>
-              <a:defRPr sz="2400">
-                <a:solidFill>
-                  <a:schemeClr val="tx1"/>
-                </a:solidFill>
-                <a:latin typeface="Arial" charset="0"/>
-                <a:ea typeface="ＭＳ Ｐゴシック" charset="0"/>
-              </a:defRPr>
-            </a:lvl8pPr>
-            <a:lvl9pPr marL="3886200" indent="-228600" eaLnBrk="0" fontAlgn="base" hangingPunct="0">
-              <a:spcBef>
-                <a:spcPct val="0"/>
-              </a:spcBef>
-              <a:spcAft>
-                <a:spcPct val="0"/>
-              </a:spcAft>
-              <a:defRPr sz="2400">
-                <a:solidFill>
-                  <a:schemeClr val="tx1"/>
-                </a:solidFill>
-                <a:latin typeface="Arial" charset="0"/>
-                <a:ea typeface="ＭＳ Ｐゴシック" charset="0"/>
-              </a:defRPr>
-            </a:lvl9pPr>
-          </a:lstStyle>
-          <a:p>
-            <a:pPr eaLnBrk="1" hangingPunct="1"/>
-            <a:fld id="{E2DEB2AF-691C-464E-9AB6-7CB46F818F0A}" type="slidenum">
-              <a:rPr lang="en-US" sz="1300">
-                <a:latin typeface="Calibri" charset="0"/>
-              </a:rPr>
-              <a:pPr eaLnBrk="1" hangingPunct="1"/>
-              <a:t>5</a:t>
-            </a:fld>
-            <a:endParaRPr lang="en-US" sz="1300">
-              <a:latin typeface="Calibri" charset="0"/>
-            </a:endParaRPr>
-          </a:p>
-        </p:txBody>
-      </p:sp>
-      <p:sp>
-        <p:nvSpPr>
-          <p:cNvPr id="14338" name="Rectangle 2"/>
-          <p:cNvSpPr>
-            <a:spLocks noGrp="1" noRot="1" noChangeAspect="1" noChangeArrowheads="1" noTextEdit="1"/>
-          </p:cNvSpPr>
-          <p:nvPr>
-            <p:ph type="sldImg"/>
-          </p:nvPr>
-        </p:nvSpPr>
-        <p:spPr bwMode="auto">
-          <a:solidFill>
-            <a:srgbClr val="FFFFFF"/>
-          </a:solidFill>
-          <a:ln>
-            <a:solidFill>
-              <a:srgbClr val="000000"/>
-            </a:solidFill>
-            <a:miter lim="800000"/>
-            <a:headEnd/>
-            <a:tailEnd/>
-          </a:ln>
-          <a:extLst>
-            <a:ext uri="{FAA26D3D-D897-4be2-8F04-BA451C77F1D7}">
-              <ma14:placeholderFlag xmlns:ma14="http://schemas.microsoft.com/office/mac/drawingml/2011/main" val="1"/>
-            </a:ext>
-          </a:extLst>
-        </p:spPr>
-      </p:sp>
-      <p:sp>
-        <p:nvSpPr>
-          <p:cNvPr id="14339" name="Rectangle 3"/>
-          <p:cNvSpPr>
-            <a:spLocks noGrp="1" noChangeArrowheads="1"/>
-          </p:cNvSpPr>
-          <p:nvPr>
-            <p:ph type="body" idx="1"/>
-          </p:nvPr>
-        </p:nvSpPr>
-        <p:spPr bwMode="auto">
-          <a:solidFill>
-            <a:srgbClr val="FFFFFF"/>
-          </a:solidFill>
-          <a:ln>
-            <a:solidFill>
-              <a:srgbClr val="000000"/>
-            </a:solidFill>
-            <a:miter lim="800000"/>
-            <a:headEnd/>
-            <a:tailEnd/>
-          </a:ln>
-        </p:spPr>
-        <p:txBody>
-          <a:bodyPr wrap="square" numCol="1" anchor="t" anchorCtr="0" compatLnSpc="1">
-            <a:prstTxWarp prst="textNoShape">
-              <a:avLst/>
-            </a:prstTxWarp>
-          </a:bodyPr>
-          <a:lstStyle/>
-          <a:p>
-            <a:pPr eaLnBrk="1" hangingPunct="1"/>
-            <a:r>
-              <a:rPr lang="en-US" altLang="ko-KR">
-                <a:latin typeface="Calibri" charset="0"/>
-                <a:ea typeface="ＭＳ Ｐゴシック" charset="0"/>
-                <a:cs typeface="ＭＳ Ｐゴシック" charset="0"/>
-              </a:rPr>
-              <a:t>Consequtive basepairs</a:t>
-            </a:r>
-            <a:endParaRPr lang="en-US">
-              <a:latin typeface="Calibri" charset="0"/>
-              <a:ea typeface="ＭＳ Ｐゴシック" charset="0"/>
-              <a:cs typeface="ＭＳ Ｐゴシック" charset="0"/>
-            </a:endParaRPr>
-          </a:p>
-        </p:txBody>
-      </p:sp>
-    </p:spTree>
-  </p:cSld>
-  <p:clrMapOvr>
-    <a:masterClrMapping/>
-  </p:clrMapOvr>
-</p:notes>
-</file>
-
 <file path=ppt/slideLayouts/slideLayout1.xml><?xml version="1.0" encoding="utf-8"?>
 <p:sldLayout xmlns:a="http://schemas.openxmlformats.org/drawingml/2006/main" xmlns:r="http://schemas.openxmlformats.org/officeDocument/2006/relationships" xmlns:p="http://schemas.openxmlformats.org/presentationml/2006/main" preserve="1" userDrawn="1">
   <p:cSld name="Title">
@@ -1431,13 +1171,6 @@
               </a:rPr>
               <a:t>RNA sequencing and analysis</a:t>
             </a:r>
-            <a:endParaRPr lang="en-US" sz="2000" b="1" dirty="0" smtClean="0">
-              <a:solidFill>
-                <a:schemeClr val="bg1"/>
-              </a:solidFill>
-              <a:latin typeface="Calibri" charset="0"/>
-              <a:cs typeface="Calibri" charset="0"/>
-            </a:endParaRPr>
           </a:p>
         </p:txBody>
       </p:sp>
@@ -1970,13 +1703,6 @@
               </a:rPr>
               <a:t>RNA sequencing and analysis</a:t>
             </a:r>
-            <a:endParaRPr lang="en-US" sz="2000" b="1" dirty="0" smtClean="0">
-              <a:solidFill>
-                <a:schemeClr val="bg1"/>
-              </a:solidFill>
-              <a:latin typeface="Calibri" charset="0"/>
-              <a:cs typeface="Calibri" charset="0"/>
-            </a:endParaRPr>
           </a:p>
         </p:txBody>
       </p:sp>
@@ -2421,13 +2147,6 @@
               </a:rPr>
               <a:t>RNA sequencing and analysis</a:t>
             </a:r>
-            <a:endParaRPr lang="en-US" sz="2000" b="1" dirty="0" smtClean="0">
-              <a:solidFill>
-                <a:schemeClr val="bg1"/>
-              </a:solidFill>
-              <a:latin typeface="Calibri" charset="0"/>
-              <a:cs typeface="Calibri" charset="0"/>
-            </a:endParaRPr>
           </a:p>
         </p:txBody>
       </p:sp>
@@ -3048,13 +2767,6 @@
               </a:rPr>
               <a:t>RNA sequencing and analysis</a:t>
             </a:r>
-            <a:endParaRPr lang="en-US" sz="2000" b="1" dirty="0" smtClean="0">
-              <a:solidFill>
-                <a:schemeClr val="bg1"/>
-              </a:solidFill>
-              <a:latin typeface="Calibri" charset="0"/>
-              <a:cs typeface="Calibri" charset="0"/>
-            </a:endParaRPr>
           </a:p>
         </p:txBody>
       </p:sp>
@@ -3531,7 +3243,7 @@
               <a:pPr>
                 <a:defRPr/>
               </a:pPr>
-              <a:t>3/4/17</a:t>
+              <a:t>7/8/17</a:t>
             </a:fld>
             <a:endParaRPr lang="en-US"/>
           </a:p>
@@ -5074,6 +4786,51 @@
               <a:defRPr/>
             </a:pPr>
             <a:r>
+              <a:rPr lang="en-US" sz="1600" dirty="0">
+                <a:ln w="1270">
+                  <a:solidFill>
+                    <a:schemeClr val="tx1">
+                      <a:alpha val="38000"/>
+                    </a:schemeClr>
+                  </a:solidFill>
+                </a:ln>
+                <a:latin typeface="Calibri"/>
+                <a:ea typeface="+mj-ea"/>
+                <a:cs typeface="Calibri"/>
+              </a:rPr>
+              <a:t>Informatics for RNA-</a:t>
+            </a:r>
+            <a:r>
+              <a:rPr lang="en-US" sz="1600" dirty="0" err="1">
+                <a:ln w="1270">
+                  <a:solidFill>
+                    <a:schemeClr val="tx1">
+                      <a:alpha val="38000"/>
+                    </a:schemeClr>
+                  </a:solidFill>
+                </a:ln>
+                <a:latin typeface="Calibri"/>
+                <a:ea typeface="+mj-ea"/>
+                <a:cs typeface="Calibri"/>
+              </a:rPr>
+              <a:t>seq</a:t>
+            </a:r>
+            <a:r>
+              <a:rPr lang="en-US" sz="1600" dirty="0">
+                <a:ln w="1270">
+                  <a:solidFill>
+                    <a:schemeClr val="tx1">
+                      <a:alpha val="38000"/>
+                    </a:schemeClr>
+                  </a:solidFill>
+                </a:ln>
+                <a:latin typeface="Calibri"/>
+                <a:ea typeface="+mj-ea"/>
+                <a:cs typeface="Calibri"/>
+              </a:rPr>
+              <a:t> </a:t>
+            </a:r>
+            <a:r>
               <a:rPr lang="en-US" sz="1600" dirty="0" smtClean="0">
                 <a:ln w="1270">
                   <a:solidFill>
@@ -5086,16 +4843,22 @@
                 <a:ea typeface="+mj-ea"/>
                 <a:cs typeface="Calibri"/>
               </a:rPr>
-              <a:t>High-Throughput Biology: From Sequence to Networks</a:t>
-            </a:r>
-          </a:p>
-          <a:p>
-            <a:pPr fontAlgn="auto">
-              <a:spcAft>
-                <a:spcPts val="0"/>
-              </a:spcAft>
-              <a:defRPr/>
-            </a:pPr>
+              <a:t>Analysis</a:t>
+            </a:r>
+            <a:br>
+              <a:rPr lang="en-US" sz="1600" dirty="0" smtClean="0">
+                <a:ln w="1270">
+                  <a:solidFill>
+                    <a:schemeClr val="tx1">
+                      <a:alpha val="38000"/>
+                    </a:schemeClr>
+                  </a:solidFill>
+                </a:ln>
+                <a:latin typeface="Calibri"/>
+                <a:ea typeface="+mj-ea"/>
+                <a:cs typeface="Calibri"/>
+              </a:rPr>
+            </a:br>
             <a:r>
               <a:rPr lang="en-US" sz="1400" dirty="0" smtClean="0">
                 <a:ln w="1270">
@@ -5109,7 +4872,22 @@
                 <a:ea typeface="+mn-ea"/>
                 <a:cs typeface="Calibri"/>
               </a:rPr>
-              <a:t>March 20-26, 2017</a:t>
+              <a:t>July 10-12, </a:t>
+            </a:r>
+            <a:r>
+              <a:rPr lang="en-US" sz="1400" dirty="0" smtClean="0">
+                <a:ln w="1270">
+                  <a:solidFill>
+                    <a:schemeClr val="tx1">
+                      <a:alpha val="38000"/>
+                    </a:schemeClr>
+                  </a:solidFill>
+                </a:ln>
+                <a:latin typeface="Calibri"/>
+                <a:ea typeface="+mn-ea"/>
+                <a:cs typeface="Calibri"/>
+              </a:rPr>
+              <a:t>2017</a:t>
             </a:r>
           </a:p>
         </p:txBody>
@@ -5356,9 +5134,9 @@
       </p:grpSpPr>
       <p:sp>
         <p:nvSpPr>
-          <p:cNvPr id="13313" name="Rectangle 2"/>
+          <p:cNvPr id="21505" name="Title 1"/>
           <p:cNvSpPr>
-            <a:spLocks noGrp="1" noChangeArrowheads="1"/>
+            <a:spLocks noGrp="1"/>
           </p:cNvSpPr>
           <p:nvPr>
             <p:ph type="title"/>
@@ -5369,176 +5147,16 @@
           <a:bodyPr/>
           <a:lstStyle/>
           <a:p>
-            <a:pPr eaLnBrk="1" hangingPunct="1"/>
-            <a:endParaRPr lang="en-US" altLang="ko-KR">
+            <a:endParaRPr lang="en-US">
               <a:latin typeface="Calibri" charset="0"/>
               <a:ea typeface="ＭＳ Ｐゴシック" charset="0"/>
-              <a:cs typeface="ＭＳ Ｐゴシック" charset="0"/>
             </a:endParaRPr>
           </a:p>
         </p:txBody>
       </p:sp>
       <p:sp>
         <p:nvSpPr>
-          <p:cNvPr id="13315" name="TextBox 3"/>
-          <p:cNvSpPr txBox="1">
-            <a:spLocks noChangeArrowheads="1"/>
-          </p:cNvSpPr>
-          <p:nvPr/>
-        </p:nvSpPr>
-        <p:spPr bwMode="auto">
-          <a:xfrm>
-            <a:off x="865188" y="6667500"/>
-            <a:ext cx="185737" cy="460375"/>
-          </a:xfrm>
-          <a:prstGeom prst="rect">
-            <a:avLst/>
-          </a:prstGeom>
-          <a:noFill/>
-          <a:ln>
-            <a:noFill/>
-          </a:ln>
-          <a:extLst>
-            <a:ext uri="{909E8E84-426E-40dd-AFC4-6F175D3DCCD1}">
-              <a14:hiddenFill xmlns:a14="http://schemas.microsoft.com/office/drawing/2010/main">
-                <a:solidFill>
-                  <a:srgbClr val="FFFFFF"/>
-                </a:solidFill>
-              </a14:hiddenFill>
-            </a:ext>
-            <a:ext uri="{91240B29-F687-4f45-9708-019B960494DF}">
-              <a14:hiddenLine xmlns:a14="http://schemas.microsoft.com/office/drawing/2010/main" w="9525">
-                <a:solidFill>
-                  <a:srgbClr val="000000"/>
-                </a:solidFill>
-                <a:miter lim="800000"/>
-                <a:headEnd/>
-                <a:tailEnd/>
-              </a14:hiddenLine>
-            </a:ext>
-          </a:extLst>
-        </p:spPr>
-        <p:txBody>
-          <a:bodyPr wrap="none">
-            <a:spAutoFit/>
-          </a:bodyPr>
-          <a:lstStyle>
-            <a:lvl1pPr eaLnBrk="0" hangingPunct="0">
-              <a:defRPr sz="2400">
-                <a:solidFill>
-                  <a:schemeClr val="tx1"/>
-                </a:solidFill>
-                <a:latin typeface="Arial" charset="0"/>
-                <a:ea typeface="ＭＳ Ｐゴシック" charset="0"/>
-                <a:cs typeface="ＭＳ Ｐゴシック" charset="0"/>
-              </a:defRPr>
-            </a:lvl1pPr>
-            <a:lvl2pPr marL="742950" indent="-285750" eaLnBrk="0" hangingPunct="0">
-              <a:defRPr sz="2400">
-                <a:solidFill>
-                  <a:schemeClr val="tx1"/>
-                </a:solidFill>
-                <a:latin typeface="Arial" charset="0"/>
-                <a:ea typeface="ＭＳ Ｐゴシック" charset="0"/>
-              </a:defRPr>
-            </a:lvl2pPr>
-            <a:lvl3pPr marL="1143000" indent="-228600" eaLnBrk="0" hangingPunct="0">
-              <a:defRPr sz="2400">
-                <a:solidFill>
-                  <a:schemeClr val="tx1"/>
-                </a:solidFill>
-                <a:latin typeface="Arial" charset="0"/>
-                <a:ea typeface="ＭＳ Ｐゴシック" charset="0"/>
-              </a:defRPr>
-            </a:lvl3pPr>
-            <a:lvl4pPr marL="1600200" indent="-228600" eaLnBrk="0" hangingPunct="0">
-              <a:defRPr sz="2400">
-                <a:solidFill>
-                  <a:schemeClr val="tx1"/>
-                </a:solidFill>
-                <a:latin typeface="Arial" charset="0"/>
-                <a:ea typeface="ＭＳ Ｐゴシック" charset="0"/>
-              </a:defRPr>
-            </a:lvl4pPr>
-            <a:lvl5pPr marL="2057400" indent="-228600" eaLnBrk="0" hangingPunct="0">
-              <a:defRPr sz="2400">
-                <a:solidFill>
-                  <a:schemeClr val="tx1"/>
-                </a:solidFill>
-                <a:latin typeface="Arial" charset="0"/>
-                <a:ea typeface="ＭＳ Ｐゴシック" charset="0"/>
-              </a:defRPr>
-            </a:lvl5pPr>
-            <a:lvl6pPr marL="2514600" indent="-228600" eaLnBrk="0" fontAlgn="base" hangingPunct="0">
-              <a:spcBef>
-                <a:spcPct val="0"/>
-              </a:spcBef>
-              <a:spcAft>
-                <a:spcPct val="0"/>
-              </a:spcAft>
-              <a:defRPr sz="2400">
-                <a:solidFill>
-                  <a:schemeClr val="tx1"/>
-                </a:solidFill>
-                <a:latin typeface="Arial" charset="0"/>
-                <a:ea typeface="ＭＳ Ｐゴシック" charset="0"/>
-              </a:defRPr>
-            </a:lvl6pPr>
-            <a:lvl7pPr marL="2971800" indent="-228600" eaLnBrk="0" fontAlgn="base" hangingPunct="0">
-              <a:spcBef>
-                <a:spcPct val="0"/>
-              </a:spcBef>
-              <a:spcAft>
-                <a:spcPct val="0"/>
-              </a:spcAft>
-              <a:defRPr sz="2400">
-                <a:solidFill>
-                  <a:schemeClr val="tx1"/>
-                </a:solidFill>
-                <a:latin typeface="Arial" charset="0"/>
-                <a:ea typeface="ＭＳ Ｐゴシック" charset="0"/>
-              </a:defRPr>
-            </a:lvl7pPr>
-            <a:lvl8pPr marL="3429000" indent="-228600" eaLnBrk="0" fontAlgn="base" hangingPunct="0">
-              <a:spcBef>
-                <a:spcPct val="0"/>
-              </a:spcBef>
-              <a:spcAft>
-                <a:spcPct val="0"/>
-              </a:spcAft>
-              <a:defRPr sz="2400">
-                <a:solidFill>
-                  <a:schemeClr val="tx1"/>
-                </a:solidFill>
-                <a:latin typeface="Arial" charset="0"/>
-                <a:ea typeface="ＭＳ Ｐゴシック" charset="0"/>
-              </a:defRPr>
-            </a:lvl8pPr>
-            <a:lvl9pPr marL="3886200" indent="-228600" eaLnBrk="0" fontAlgn="base" hangingPunct="0">
-              <a:spcBef>
-                <a:spcPct val="0"/>
-              </a:spcBef>
-              <a:spcAft>
-                <a:spcPct val="0"/>
-              </a:spcAft>
-              <a:defRPr sz="2400">
-                <a:solidFill>
-                  <a:schemeClr val="tx1"/>
-                </a:solidFill>
-                <a:latin typeface="Arial" charset="0"/>
-                <a:ea typeface="ＭＳ Ｐゴシック" charset="0"/>
-              </a:defRPr>
-            </a:lvl9pPr>
-          </a:lstStyle>
-          <a:p>
-            <a:pPr eaLnBrk="1" hangingPunct="1"/>
-            <a:endParaRPr lang="en-US"/>
-          </a:p>
-        </p:txBody>
-      </p:sp>
-      <p:sp>
-        <p:nvSpPr>
-          <p:cNvPr id="2" name="Content Placeholder 1"/>
+          <p:cNvPr id="21506" name="Content Placeholder 2"/>
           <p:cNvSpPr>
             <a:spLocks noGrp="1"/>
           </p:cNvSpPr>
@@ -5551,7 +5169,10 @@
           <a:bodyPr/>
           <a:lstStyle/>
           <a:p>
-            <a:endParaRPr lang="en-US"/>
+            <a:endParaRPr lang="en-US">
+              <a:latin typeface="Calibri" charset="0"/>
+              <a:ea typeface="ＭＳ Ｐゴシック" charset="0"/>
+            </a:endParaRPr>
           </a:p>
         </p:txBody>
       </p:sp>
@@ -5571,82 +5192,6 @@
 </file>
 
 <file path=ppt/slides/slide6.xml><?xml version="1.0" encoding="utf-8"?>
-<p:sld xmlns:a="http://schemas.openxmlformats.org/drawingml/2006/main" xmlns:r="http://schemas.openxmlformats.org/officeDocument/2006/relationships" xmlns:p="http://schemas.openxmlformats.org/presentationml/2006/main">
-  <p:cSld>
-    <p:spTree>
-      <p:nvGrpSpPr>
-        <p:cNvPr id="1" name=""/>
-        <p:cNvGrpSpPr/>
-        <p:nvPr/>
-      </p:nvGrpSpPr>
-      <p:grpSpPr>
-        <a:xfrm>
-          <a:off x="0" y="0"/>
-          <a:ext cx="0" cy="0"/>
-          <a:chOff x="0" y="0"/>
-          <a:chExt cx="0" cy="0"/>
-        </a:xfrm>
-      </p:grpSpPr>
-      <p:sp>
-        <p:nvSpPr>
-          <p:cNvPr id="21505" name="Title 1"/>
-          <p:cNvSpPr>
-            <a:spLocks noGrp="1"/>
-          </p:cNvSpPr>
-          <p:nvPr>
-            <p:ph type="title"/>
-          </p:nvPr>
-        </p:nvSpPr>
-        <p:spPr/>
-        <p:txBody>
-          <a:bodyPr/>
-          <a:lstStyle/>
-          <a:p>
-            <a:endParaRPr lang="en-US">
-              <a:latin typeface="Calibri" charset="0"/>
-              <a:ea typeface="ＭＳ Ｐゴシック" charset="0"/>
-            </a:endParaRPr>
-          </a:p>
-        </p:txBody>
-      </p:sp>
-      <p:sp>
-        <p:nvSpPr>
-          <p:cNvPr id="21506" name="Content Placeholder 2"/>
-          <p:cNvSpPr>
-            <a:spLocks noGrp="1"/>
-          </p:cNvSpPr>
-          <p:nvPr>
-            <p:ph idx="1"/>
-          </p:nvPr>
-        </p:nvSpPr>
-        <p:spPr/>
-        <p:txBody>
-          <a:bodyPr/>
-          <a:lstStyle/>
-          <a:p>
-            <a:endParaRPr lang="en-US">
-              <a:latin typeface="Calibri" charset="0"/>
-              <a:ea typeface="ＭＳ Ｐゴシック" charset="0"/>
-            </a:endParaRPr>
-          </a:p>
-        </p:txBody>
-      </p:sp>
-    </p:spTree>
-  </p:cSld>
-  <p:clrMapOvr>
-    <a:masterClrMapping/>
-  </p:clrMapOvr>
-  <p:timing>
-    <p:tnLst>
-      <p:par>
-        <p:cTn xmlns:p14="http://schemas.microsoft.com/office/powerpoint/2010/main" id="1" dur="indefinite" restart="never" nodeType="tmRoot"/>
-      </p:par>
-    </p:tnLst>
-  </p:timing>
-</p:sld>
-</file>
-
-<file path=ppt/slides/slide7.xml><?xml version="1.0" encoding="utf-8"?>
 <p:sld xmlns:a="http://schemas.openxmlformats.org/drawingml/2006/main" xmlns:r="http://schemas.openxmlformats.org/officeDocument/2006/relationships" xmlns:p="http://schemas.openxmlformats.org/presentationml/2006/main">
   <p:cSld>
     <p:spTree>

</xml_diff>